<commit_message>
Update Lecture 06 and Lecture 07
</commit_message>
<xml_diff>
--- a/ComputerVision/Lecture 06 - Image Descriptors/Lecture 06 - Image Descriptors.pptx
+++ b/ComputerVision/Lecture 06 - Image Descriptors/Lecture 06 - Image Descriptors.pptx
@@ -11225,33 +11225,6 @@
                   <a:srgbClr val="1C1C1C"/>
                 </a:solidFill>
                 <a:latin typeface="Calibri" panose="020F0502020204030204" pitchFamily="34" charset="0"/>
-                <a:ea typeface="DejaVu Sans"/>
-                <a:cs typeface="Calibri" panose="020F0502020204030204" pitchFamily="34" charset="0"/>
-              </a:rPr>
-              <a:t>Classification</a:t>
-            </a:r>
-          </a:p>
-          <a:p>
-            <a:pPr marL="216000" indent="-212400">
-              <a:lnSpc>
-                <a:spcPct val="100000"/>
-              </a:lnSpc>
-              <a:spcAft>
-                <a:spcPts val="1140"/>
-              </a:spcAft>
-              <a:buClr>
-                <a:srgbClr val="000000"/>
-              </a:buClr>
-              <a:buSzPct val="45000"/>
-              <a:buFont typeface="Wingdings" charset="2"/>
-              <a:buChar char=""/>
-            </a:pPr>
-            <a:r>
-              <a:rPr lang="en-US" sz="2000" strike="noStrike" spc="-1" dirty="0">
-                <a:solidFill>
-                  <a:srgbClr val="1C1C1C"/>
-                </a:solidFill>
-                <a:latin typeface="Calibri" panose="020F0502020204030204" pitchFamily="34" charset="0"/>
                 <a:cs typeface="Calibri" panose="020F0502020204030204" pitchFamily="34" charset="0"/>
               </a:rPr>
               <a:t>Practice</a:t>

</xml_diff>